<commit_message>
Extended the Concept Presentation
</commit_message>
<xml_diff>
--- a/Concept/Dokumentation/Computergrafik.pptx
+++ b/Concept/Dokumentation/Computergrafik.pptx
@@ -11,8 +11,8 @@
     <p:sldId id="258" r:id="rId5"/>
     <p:sldId id="260" r:id="rId6"/>
     <p:sldId id="259" r:id="rId7"/>
-    <p:sldId id="261" r:id="rId8"/>
-    <p:sldId id="263" r:id="rId9"/>
+    <p:sldId id="263" r:id="rId8"/>
+    <p:sldId id="261" r:id="rId9"/>
   </p:sldIdLst>
   <p:sldSz cx="12192000" cy="6858000"/>
   <p:notesSz cx="6858000" cy="9144000"/>
@@ -111,6 +111,11 @@
       </a:defRPr>
     </a:lvl9pPr>
   </p:defaultTextStyle>
+  <p:extLst>
+    <p:ext uri="{EFAFB233-063F-42B5-8137-9DF3F51BA10A}">
+      <p15:sldGuideLst xmlns:p15="http://schemas.microsoft.com/office/powerpoint/2012/main"/>
+    </p:ext>
+  </p:extLst>
 </p:presentation>
 </file>
 
@@ -156,10 +161,9 @@
           </a:lstStyle>
           <a:p>
             <a:r>
-              <a:rPr lang="de-DE" smtClean="0"/>
+              <a:rPr lang="de-DE"/>
               <a:t>Titelmasterformat durch Klicken bearbeiten</a:t>
             </a:r>
-            <a:endParaRPr lang="de-DE"/>
           </a:p>
         </p:txBody>
       </p:sp>
@@ -221,10 +225,9 @@
           </a:lstStyle>
           <a:p>
             <a:r>
-              <a:rPr lang="de-DE" smtClean="0"/>
+              <a:rPr lang="de-DE"/>
               <a:t>Formatvorlage des Untertitelmasters durch Klicken bearbeiten</a:t>
             </a:r>
-            <a:endParaRPr lang="de-DE"/>
           </a:p>
         </p:txBody>
       </p:sp>
@@ -339,10 +342,9 @@
           <a:lstStyle/>
           <a:p>
             <a:r>
-              <a:rPr lang="de-DE" smtClean="0"/>
+              <a:rPr lang="de-DE"/>
               <a:t>Titelmasterformat durch Klicken bearbeiten</a:t>
             </a:r>
-            <a:endParaRPr lang="de-DE"/>
           </a:p>
         </p:txBody>
       </p:sp>
@@ -363,38 +365,37 @@
           <a:p>
             <a:pPr lvl="0"/>
             <a:r>
-              <a:rPr lang="de-DE" smtClean="0"/>
+              <a:rPr lang="de-DE"/>
               <a:t>Formatvorlagen des Textmasters bearbeiten</a:t>
             </a:r>
           </a:p>
           <a:p>
             <a:pPr lvl="1"/>
             <a:r>
-              <a:rPr lang="de-DE" smtClean="0"/>
+              <a:rPr lang="de-DE"/>
               <a:t>Zweite Ebene</a:t>
             </a:r>
           </a:p>
           <a:p>
             <a:pPr lvl="2"/>
             <a:r>
-              <a:rPr lang="de-DE" smtClean="0"/>
+              <a:rPr lang="de-DE"/>
               <a:t>Dritte Ebene</a:t>
             </a:r>
           </a:p>
           <a:p>
             <a:pPr lvl="3"/>
             <a:r>
-              <a:rPr lang="de-DE" smtClean="0"/>
+              <a:rPr lang="de-DE"/>
               <a:t>Vierte Ebene</a:t>
             </a:r>
           </a:p>
           <a:p>
             <a:pPr lvl="4"/>
             <a:r>
-              <a:rPr lang="de-DE" smtClean="0"/>
+              <a:rPr lang="de-DE"/>
               <a:t>Fünfte Ebene</a:t>
             </a:r>
-            <a:endParaRPr lang="de-DE"/>
           </a:p>
         </p:txBody>
       </p:sp>
@@ -514,10 +515,9 @@
           <a:lstStyle/>
           <a:p>
             <a:r>
-              <a:rPr lang="de-DE" smtClean="0"/>
+              <a:rPr lang="de-DE"/>
               <a:t>Titelmasterformat durch Klicken bearbeiten</a:t>
             </a:r>
-            <a:endParaRPr lang="de-DE"/>
           </a:p>
         </p:txBody>
       </p:sp>
@@ -543,38 +543,37 @@
           <a:p>
             <a:pPr lvl="0"/>
             <a:r>
-              <a:rPr lang="de-DE" smtClean="0"/>
+              <a:rPr lang="de-DE"/>
               <a:t>Formatvorlagen des Textmasters bearbeiten</a:t>
             </a:r>
           </a:p>
           <a:p>
             <a:pPr lvl="1"/>
             <a:r>
-              <a:rPr lang="de-DE" smtClean="0"/>
+              <a:rPr lang="de-DE"/>
               <a:t>Zweite Ebene</a:t>
             </a:r>
           </a:p>
           <a:p>
             <a:pPr lvl="2"/>
             <a:r>
-              <a:rPr lang="de-DE" smtClean="0"/>
+              <a:rPr lang="de-DE"/>
               <a:t>Dritte Ebene</a:t>
             </a:r>
           </a:p>
           <a:p>
             <a:pPr lvl="3"/>
             <a:r>
-              <a:rPr lang="de-DE" smtClean="0"/>
+              <a:rPr lang="de-DE"/>
               <a:t>Vierte Ebene</a:t>
             </a:r>
           </a:p>
           <a:p>
             <a:pPr lvl="4"/>
             <a:r>
-              <a:rPr lang="de-DE" smtClean="0"/>
+              <a:rPr lang="de-DE"/>
               <a:t>Fünfte Ebene</a:t>
             </a:r>
-            <a:endParaRPr lang="de-DE"/>
           </a:p>
         </p:txBody>
       </p:sp>
@@ -689,10 +688,9 @@
           <a:lstStyle/>
           <a:p>
             <a:r>
-              <a:rPr lang="de-DE" smtClean="0"/>
+              <a:rPr lang="de-DE"/>
               <a:t>Titelmasterformat durch Klicken bearbeiten</a:t>
             </a:r>
-            <a:endParaRPr lang="de-DE"/>
           </a:p>
         </p:txBody>
       </p:sp>
@@ -713,38 +711,37 @@
           <a:p>
             <a:pPr lvl="0"/>
             <a:r>
-              <a:rPr lang="de-DE" smtClean="0"/>
+              <a:rPr lang="de-DE"/>
               <a:t>Formatvorlagen des Textmasters bearbeiten</a:t>
             </a:r>
           </a:p>
           <a:p>
             <a:pPr lvl="1"/>
             <a:r>
-              <a:rPr lang="de-DE" smtClean="0"/>
+              <a:rPr lang="de-DE"/>
               <a:t>Zweite Ebene</a:t>
             </a:r>
           </a:p>
           <a:p>
             <a:pPr lvl="2"/>
             <a:r>
-              <a:rPr lang="de-DE" smtClean="0"/>
+              <a:rPr lang="de-DE"/>
               <a:t>Dritte Ebene</a:t>
             </a:r>
           </a:p>
           <a:p>
             <a:pPr lvl="3"/>
             <a:r>
-              <a:rPr lang="de-DE" smtClean="0"/>
+              <a:rPr lang="de-DE"/>
               <a:t>Vierte Ebene</a:t>
             </a:r>
           </a:p>
           <a:p>
             <a:pPr lvl="4"/>
             <a:r>
-              <a:rPr lang="de-DE" smtClean="0"/>
+              <a:rPr lang="de-DE"/>
               <a:t>Fünfte Ebene</a:t>
             </a:r>
-            <a:endParaRPr lang="de-DE"/>
           </a:p>
         </p:txBody>
       </p:sp>
@@ -868,10 +865,9 @@
           </a:lstStyle>
           <a:p>
             <a:r>
-              <a:rPr lang="de-DE" smtClean="0"/>
+              <a:rPr lang="de-DE"/>
               <a:t>Titelmasterformat durch Klicken bearbeiten</a:t>
             </a:r>
-            <a:endParaRPr lang="de-DE"/>
           </a:p>
         </p:txBody>
       </p:sp>
@@ -988,7 +984,7 @@
           <a:p>
             <a:pPr lvl="0"/>
             <a:r>
-              <a:rPr lang="de-DE" smtClean="0"/>
+              <a:rPr lang="de-DE"/>
               <a:t>Formatvorlagen des Textmasters bearbeiten</a:t>
             </a:r>
           </a:p>
@@ -1105,10 +1101,9 @@
           <a:lstStyle/>
           <a:p>
             <a:r>
-              <a:rPr lang="de-DE" smtClean="0"/>
+              <a:rPr lang="de-DE"/>
               <a:t>Titelmasterformat durch Klicken bearbeiten</a:t>
             </a:r>
-            <a:endParaRPr lang="de-DE"/>
           </a:p>
         </p:txBody>
       </p:sp>
@@ -1134,38 +1129,37 @@
           <a:p>
             <a:pPr lvl="0"/>
             <a:r>
-              <a:rPr lang="de-DE" smtClean="0"/>
+              <a:rPr lang="de-DE"/>
               <a:t>Formatvorlagen des Textmasters bearbeiten</a:t>
             </a:r>
           </a:p>
           <a:p>
             <a:pPr lvl="1"/>
             <a:r>
-              <a:rPr lang="de-DE" smtClean="0"/>
+              <a:rPr lang="de-DE"/>
               <a:t>Zweite Ebene</a:t>
             </a:r>
           </a:p>
           <a:p>
             <a:pPr lvl="2"/>
             <a:r>
-              <a:rPr lang="de-DE" smtClean="0"/>
+              <a:rPr lang="de-DE"/>
               <a:t>Dritte Ebene</a:t>
             </a:r>
           </a:p>
           <a:p>
             <a:pPr lvl="3"/>
             <a:r>
-              <a:rPr lang="de-DE" smtClean="0"/>
+              <a:rPr lang="de-DE"/>
               <a:t>Vierte Ebene</a:t>
             </a:r>
           </a:p>
           <a:p>
             <a:pPr lvl="4"/>
             <a:r>
-              <a:rPr lang="de-DE" smtClean="0"/>
+              <a:rPr lang="de-DE"/>
               <a:t>Fünfte Ebene</a:t>
             </a:r>
-            <a:endParaRPr lang="de-DE"/>
           </a:p>
         </p:txBody>
       </p:sp>
@@ -1191,38 +1185,37 @@
           <a:p>
             <a:pPr lvl="0"/>
             <a:r>
-              <a:rPr lang="de-DE" smtClean="0"/>
+              <a:rPr lang="de-DE"/>
               <a:t>Formatvorlagen des Textmasters bearbeiten</a:t>
             </a:r>
           </a:p>
           <a:p>
             <a:pPr lvl="1"/>
             <a:r>
-              <a:rPr lang="de-DE" smtClean="0"/>
+              <a:rPr lang="de-DE"/>
               <a:t>Zweite Ebene</a:t>
             </a:r>
           </a:p>
           <a:p>
             <a:pPr lvl="2"/>
             <a:r>
-              <a:rPr lang="de-DE" smtClean="0"/>
+              <a:rPr lang="de-DE"/>
               <a:t>Dritte Ebene</a:t>
             </a:r>
           </a:p>
           <a:p>
             <a:pPr lvl="3"/>
             <a:r>
-              <a:rPr lang="de-DE" smtClean="0"/>
+              <a:rPr lang="de-DE"/>
               <a:t>Vierte Ebene</a:t>
             </a:r>
           </a:p>
           <a:p>
             <a:pPr lvl="4"/>
             <a:r>
-              <a:rPr lang="de-DE" smtClean="0"/>
+              <a:rPr lang="de-DE"/>
               <a:t>Fünfte Ebene</a:t>
             </a:r>
-            <a:endParaRPr lang="de-DE"/>
           </a:p>
         </p:txBody>
       </p:sp>
@@ -1342,10 +1335,9 @@
           <a:lstStyle/>
           <a:p>
             <a:r>
-              <a:rPr lang="de-DE" smtClean="0"/>
+              <a:rPr lang="de-DE"/>
               <a:t>Titelmasterformat durch Klicken bearbeiten</a:t>
             </a:r>
-            <a:endParaRPr lang="de-DE"/>
           </a:p>
         </p:txBody>
       </p:sp>
@@ -1408,7 +1400,7 @@
           <a:p>
             <a:pPr lvl="0"/>
             <a:r>
-              <a:rPr lang="de-DE" smtClean="0"/>
+              <a:rPr lang="de-DE"/>
               <a:t>Formatvorlagen des Textmasters bearbeiten</a:t>
             </a:r>
           </a:p>
@@ -1436,38 +1428,37 @@
           <a:p>
             <a:pPr lvl="0"/>
             <a:r>
-              <a:rPr lang="de-DE" smtClean="0"/>
+              <a:rPr lang="de-DE"/>
               <a:t>Formatvorlagen des Textmasters bearbeiten</a:t>
             </a:r>
           </a:p>
           <a:p>
             <a:pPr lvl="1"/>
             <a:r>
-              <a:rPr lang="de-DE" smtClean="0"/>
+              <a:rPr lang="de-DE"/>
               <a:t>Zweite Ebene</a:t>
             </a:r>
           </a:p>
           <a:p>
             <a:pPr lvl="2"/>
             <a:r>
-              <a:rPr lang="de-DE" smtClean="0"/>
+              <a:rPr lang="de-DE"/>
               <a:t>Dritte Ebene</a:t>
             </a:r>
           </a:p>
           <a:p>
             <a:pPr lvl="3"/>
             <a:r>
-              <a:rPr lang="de-DE" smtClean="0"/>
+              <a:rPr lang="de-DE"/>
               <a:t>Vierte Ebene</a:t>
             </a:r>
           </a:p>
           <a:p>
             <a:pPr lvl="4"/>
             <a:r>
-              <a:rPr lang="de-DE" smtClean="0"/>
+              <a:rPr lang="de-DE"/>
               <a:t>Fünfte Ebene</a:t>
             </a:r>
-            <a:endParaRPr lang="de-DE"/>
           </a:p>
         </p:txBody>
       </p:sp>
@@ -1530,7 +1521,7 @@
           <a:p>
             <a:pPr lvl="0"/>
             <a:r>
-              <a:rPr lang="de-DE" smtClean="0"/>
+              <a:rPr lang="de-DE"/>
               <a:t>Formatvorlagen des Textmasters bearbeiten</a:t>
             </a:r>
           </a:p>
@@ -1558,38 +1549,37 @@
           <a:p>
             <a:pPr lvl="0"/>
             <a:r>
-              <a:rPr lang="de-DE" smtClean="0"/>
+              <a:rPr lang="de-DE"/>
               <a:t>Formatvorlagen des Textmasters bearbeiten</a:t>
             </a:r>
           </a:p>
           <a:p>
             <a:pPr lvl="1"/>
             <a:r>
-              <a:rPr lang="de-DE" smtClean="0"/>
+              <a:rPr lang="de-DE"/>
               <a:t>Zweite Ebene</a:t>
             </a:r>
           </a:p>
           <a:p>
             <a:pPr lvl="2"/>
             <a:r>
-              <a:rPr lang="de-DE" smtClean="0"/>
+              <a:rPr lang="de-DE"/>
               <a:t>Dritte Ebene</a:t>
             </a:r>
           </a:p>
           <a:p>
             <a:pPr lvl="3"/>
             <a:r>
-              <a:rPr lang="de-DE" smtClean="0"/>
+              <a:rPr lang="de-DE"/>
               <a:t>Vierte Ebene</a:t>
             </a:r>
           </a:p>
           <a:p>
             <a:pPr lvl="4"/>
             <a:r>
-              <a:rPr lang="de-DE" smtClean="0"/>
+              <a:rPr lang="de-DE"/>
               <a:t>Fünfte Ebene</a:t>
             </a:r>
-            <a:endParaRPr lang="de-DE"/>
           </a:p>
         </p:txBody>
       </p:sp>
@@ -1704,10 +1694,9 @@
           <a:lstStyle/>
           <a:p>
             <a:r>
-              <a:rPr lang="de-DE" smtClean="0"/>
+              <a:rPr lang="de-DE"/>
               <a:t>Titelmasterformat durch Klicken bearbeiten</a:t>
             </a:r>
-            <a:endParaRPr lang="de-DE"/>
           </a:p>
         </p:txBody>
       </p:sp>
@@ -1926,10 +1915,9 @@
           </a:lstStyle>
           <a:p>
             <a:r>
-              <a:rPr lang="de-DE" smtClean="0"/>
+              <a:rPr lang="de-DE"/>
               <a:t>Titelmasterformat durch Klicken bearbeiten</a:t>
             </a:r>
-            <a:endParaRPr lang="de-DE"/>
           </a:p>
         </p:txBody>
       </p:sp>
@@ -1983,38 +1971,37 @@
           <a:p>
             <a:pPr lvl="0"/>
             <a:r>
-              <a:rPr lang="de-DE" smtClean="0"/>
+              <a:rPr lang="de-DE"/>
               <a:t>Formatvorlagen des Textmasters bearbeiten</a:t>
             </a:r>
           </a:p>
           <a:p>
             <a:pPr lvl="1"/>
             <a:r>
-              <a:rPr lang="de-DE" smtClean="0"/>
+              <a:rPr lang="de-DE"/>
               <a:t>Zweite Ebene</a:t>
             </a:r>
           </a:p>
           <a:p>
             <a:pPr lvl="2"/>
             <a:r>
-              <a:rPr lang="de-DE" smtClean="0"/>
+              <a:rPr lang="de-DE"/>
               <a:t>Dritte Ebene</a:t>
             </a:r>
           </a:p>
           <a:p>
             <a:pPr lvl="3"/>
             <a:r>
-              <a:rPr lang="de-DE" smtClean="0"/>
+              <a:rPr lang="de-DE"/>
               <a:t>Vierte Ebene</a:t>
             </a:r>
           </a:p>
           <a:p>
             <a:pPr lvl="4"/>
             <a:r>
-              <a:rPr lang="de-DE" smtClean="0"/>
+              <a:rPr lang="de-DE"/>
               <a:t>Fünfte Ebene</a:t>
             </a:r>
-            <a:endParaRPr lang="de-DE"/>
           </a:p>
         </p:txBody>
       </p:sp>
@@ -2077,7 +2064,7 @@
           <a:p>
             <a:pPr lvl="0"/>
             <a:r>
-              <a:rPr lang="de-DE" smtClean="0"/>
+              <a:rPr lang="de-DE"/>
               <a:t>Formatvorlagen des Textmasters bearbeiten</a:t>
             </a:r>
           </a:p>
@@ -2203,10 +2190,9 @@
           </a:lstStyle>
           <a:p>
             <a:r>
-              <a:rPr lang="de-DE" smtClean="0"/>
+              <a:rPr lang="de-DE"/>
               <a:t>Titelmasterformat durch Klicken bearbeiten</a:t>
             </a:r>
-            <a:endParaRPr lang="de-DE"/>
           </a:p>
         </p:txBody>
       </p:sp>
@@ -2330,7 +2316,7 @@
           <a:p>
             <a:pPr lvl="0"/>
             <a:r>
-              <a:rPr lang="de-DE" smtClean="0"/>
+              <a:rPr lang="de-DE"/>
               <a:t>Formatvorlagen des Textmasters bearbeiten</a:t>
             </a:r>
           </a:p>
@@ -2471,10 +2457,9 @@
           <a:lstStyle/>
           <a:p>
             <a:r>
-              <a:rPr lang="de-DE" smtClean="0"/>
+              <a:rPr lang="de-DE"/>
               <a:t>Titelmasterformat durch Klicken bearbeiten</a:t>
             </a:r>
-            <a:endParaRPr lang="de-DE"/>
           </a:p>
         </p:txBody>
       </p:sp>
@@ -2505,38 +2490,37 @@
           <a:p>
             <a:pPr lvl="0"/>
             <a:r>
-              <a:rPr lang="de-DE" smtClean="0"/>
+              <a:rPr lang="de-DE"/>
               <a:t>Formatvorlagen des Textmasters bearbeiten</a:t>
             </a:r>
           </a:p>
           <a:p>
             <a:pPr lvl="1"/>
             <a:r>
-              <a:rPr lang="de-DE" smtClean="0"/>
+              <a:rPr lang="de-DE"/>
               <a:t>Zweite Ebene</a:t>
             </a:r>
           </a:p>
           <a:p>
             <a:pPr lvl="2"/>
             <a:r>
-              <a:rPr lang="de-DE" smtClean="0"/>
+              <a:rPr lang="de-DE"/>
               <a:t>Dritte Ebene</a:t>
             </a:r>
           </a:p>
           <a:p>
             <a:pPr lvl="3"/>
             <a:r>
-              <a:rPr lang="de-DE" smtClean="0"/>
+              <a:rPr lang="de-DE"/>
               <a:t>Vierte Ebene</a:t>
             </a:r>
           </a:p>
           <a:p>
             <a:pPr lvl="4"/>
             <a:r>
-              <a:rPr lang="de-DE" smtClean="0"/>
+              <a:rPr lang="de-DE"/>
               <a:t>Fünfte Ebene</a:t>
             </a:r>
-            <a:endParaRPr lang="de-DE"/>
           </a:p>
         </p:txBody>
       </p:sp>
@@ -2998,13 +2982,6 @@
   <p:clrMapOvr>
     <a:masterClrMapping/>
   </p:clrMapOvr>
-  <p:timing>
-    <p:tnLst>
-      <p:par>
-        <p:cTn id="1" dur="indefinite" restart="never" nodeType="tmRoot"/>
-      </p:par>
-    </p:tnLst>
-  </p:timing>
 </p:sld>
 </file>
 
@@ -3076,13 +3053,6 @@
   <p:clrMapOvr>
     <a:masterClrMapping/>
   </p:clrMapOvr>
-  <p:timing>
-    <p:tnLst>
-      <p:par>
-        <p:cTn id="1" dur="indefinite" restart="never" nodeType="tmRoot"/>
-      </p:par>
-    </p:tnLst>
-  </p:timing>
 </p:sld>
 </file>
 
@@ -3105,61 +3075,48 @@
       </p:grpSpPr>
       <p:sp>
         <p:nvSpPr>
-          <p:cNvPr id="2" name="Titel 1"/>
-          <p:cNvSpPr>
-            <a:spLocks noGrp="1"/>
-          </p:cNvSpPr>
-          <p:nvPr>
-            <p:ph type="ctrTitle"/>
+          <p:cNvPr id="3" name="Untertitel 2"/>
+          <p:cNvSpPr>
+            <a:spLocks noGrp="1"/>
+          </p:cNvSpPr>
+          <p:nvPr>
+            <p:ph type="subTitle" idx="1"/>
           </p:nvPr>
         </p:nvSpPr>
         <p:spPr>
           <a:xfrm>
-            <a:off x="1524000" y="268923"/>
-            <a:ext cx="9144000" cy="2387600"/>
+            <a:off x="1444101" y="926161"/>
+            <a:ext cx="9144000" cy="1248868"/>
           </a:xfrm>
         </p:spPr>
         <p:txBody>
           <a:bodyPr>
-            <a:normAutofit/>
+            <a:normAutofit fontScale="32500" lnSpcReduction="20000"/>
           </a:bodyPr>
           <a:lstStyle/>
           <a:p>
             <a:r>
-              <a:rPr lang="de-DE" sz="8000" dirty="0" smtClean="0"/>
-              <a:t>Computergrafik</a:t>
-            </a:r>
-            <a:endParaRPr lang="de-DE" sz="8000" dirty="0"/>
-          </a:p>
-        </p:txBody>
-      </p:sp>
-      <p:sp>
-        <p:nvSpPr>
-          <p:cNvPr id="3" name="Untertitel 2"/>
-          <p:cNvSpPr>
-            <a:spLocks noGrp="1"/>
-          </p:cNvSpPr>
-          <p:nvPr>
-            <p:ph type="subTitle" idx="1"/>
-          </p:nvPr>
-        </p:nvSpPr>
-        <p:spPr>
-          <a:xfrm>
-            <a:off x="1524000" y="2763838"/>
-            <a:ext cx="9144000" cy="1655762"/>
-          </a:xfrm>
-        </p:spPr>
-        <p:txBody>
-          <a:bodyPr>
-            <a:normAutofit/>
-          </a:bodyPr>
-          <a:lstStyle/>
-          <a:p>
-            <a:r>
-              <a:rPr lang="de-DE" sz="4400" dirty="0" smtClean="0"/>
-              <a:t>Athene</a:t>
-            </a:r>
-            <a:endParaRPr lang="de-DE" sz="4400" dirty="0"/>
+              <a:rPr lang="de-DE" sz="9600" dirty="0"/>
+              <a:t>Hier könnte ein Name stehen</a:t>
+            </a:r>
+          </a:p>
+          <a:p>
+            <a:r>
+              <a:rPr lang="de-DE" sz="3600" dirty="0"/>
+              <a:t>(Project: Athene)</a:t>
+            </a:r>
+          </a:p>
+          <a:p>
+            <a:r>
+              <a:rPr lang="de-DE" sz="3600" dirty="0"/>
+              <a:t>Ein Jump ‚n‘ Run</a:t>
+            </a:r>
+          </a:p>
+          <a:p>
+            <a:r>
+              <a:rPr lang="de-DE" sz="3600" dirty="0"/>
+              <a:t>Von Steffen und Eric</a:t>
+            </a:r>
           </a:p>
         </p:txBody>
       </p:sp>
@@ -3173,13 +3130,6 @@
   <p:clrMapOvr>
     <a:masterClrMapping/>
   </p:clrMapOvr>
-  <p:timing>
-    <p:tnLst>
-      <p:par>
-        <p:cTn id="1" dur="indefinite" restart="never" nodeType="tmRoot"/>
-      </p:par>
-    </p:tnLst>
-  </p:timing>
 </p:sld>
 </file>
 
@@ -3218,14 +3168,9 @@
           <a:lstStyle/>
           <a:p>
             <a:r>
-              <a:rPr lang="de-DE" sz="4800" dirty="0" smtClean="0"/>
-              <a:t>Mutierte Tiere sind </a:t>
-            </a:r>
-            <a:r>
-              <a:rPr lang="de-DE" sz="4800" dirty="0" err="1" smtClean="0"/>
-              <a:t>aggresiv</a:t>
-            </a:r>
-            <a:endParaRPr lang="de-DE" sz="4800" dirty="0"/>
+              <a:rPr lang="de-DE" sz="4800" dirty="0"/>
+              <a:t>Tierchen (Gegner)</a:t>
+            </a:r>
           </a:p>
         </p:txBody>
       </p:sp>
@@ -3242,7 +3187,7 @@
         <p:spPr>
           <a:xfrm>
             <a:off x="838200" y="1825625"/>
-            <a:ext cx="10515600" cy="4351338"/>
+            <a:ext cx="10515600" cy="2471167"/>
           </a:xfrm>
         </p:spPr>
         <p:txBody>
@@ -3252,20 +3197,26 @@
           <a:lstStyle/>
           <a:p>
             <a:r>
-              <a:rPr lang="de-DE" sz="3200" dirty="0" smtClean="0"/>
-              <a:t>Mutierte Tiere greifen aufgrund der Infektion den Spieler an</a:t>
-            </a:r>
-          </a:p>
-          <a:p>
-            <a:r>
-              <a:rPr lang="de-DE" sz="3200" dirty="0" smtClean="0"/>
+              <a:rPr lang="de-DE" sz="3200" dirty="0"/>
+              <a:t>Flüssigkeiten vom Raumschiff </a:t>
+            </a:r>
+            <a:r>
+              <a:rPr lang="de-DE" sz="3200" dirty="0">
+                <a:sym typeface="Wingdings" panose="05000000000000000000" pitchFamily="2" charset="2"/>
+              </a:rPr>
+              <a:t> Tiere „mutieren“</a:t>
+            </a:r>
+          </a:p>
+          <a:p>
+            <a:r>
+              <a:rPr lang="de-DE" sz="3200" dirty="0"/>
               <a:t>Spieler muss sich mit Waffen verteidigen</a:t>
             </a:r>
           </a:p>
           <a:p>
             <a:r>
-              <a:rPr lang="de-DE" sz="3200" dirty="0" smtClean="0"/>
-              <a:t>Verschiedene Gegner</a:t>
+              <a:rPr lang="de-DE" sz="3200" dirty="0"/>
+              <a:t>Verschiedene Verhalten / Angriffe</a:t>
             </a:r>
           </a:p>
         </p:txBody>
@@ -3310,13 +3261,6 @@
   <p:clrMapOvr>
     <a:masterClrMapping/>
   </p:clrMapOvr>
-  <p:timing>
-    <p:tnLst>
-      <p:par>
-        <p:cTn id="1" dur="indefinite" restart="never" nodeType="tmRoot"/>
-      </p:par>
-    </p:tnLst>
-  </p:timing>
 </p:sld>
 </file>
 
@@ -3355,10 +3299,9 @@
           <a:lstStyle/>
           <a:p>
             <a:r>
-              <a:rPr lang="de-DE" sz="4800" dirty="0" smtClean="0"/>
-              <a:t>Roboter als Helfer</a:t>
-            </a:r>
-            <a:endParaRPr lang="de-DE" sz="4800" dirty="0"/>
+              <a:rPr lang="de-DE" sz="4800" dirty="0"/>
+              <a:t>Roboter (Helfer)</a:t>
+            </a:r>
           </a:p>
         </p:txBody>
       </p:sp>
@@ -3372,7 +3315,12 @@
             <p:ph idx="1"/>
           </p:nvPr>
         </p:nvSpPr>
-        <p:spPr/>
+        <p:spPr>
+          <a:xfrm>
+            <a:off x="838200" y="1825625"/>
+            <a:ext cx="10515600" cy="2799641"/>
+          </a:xfrm>
+        </p:spPr>
         <p:txBody>
           <a:bodyPr>
             <a:normAutofit/>
@@ -3380,28 +3328,27 @@
           <a:lstStyle/>
           <a:p>
             <a:r>
-              <a:rPr lang="de-DE" sz="3200" dirty="0" smtClean="0"/>
+              <a:rPr lang="de-DE" sz="3200" dirty="0"/>
               <a:t>Verloren durch das Raumschiff</a:t>
             </a:r>
           </a:p>
           <a:p>
             <a:r>
-              <a:rPr lang="de-DE" sz="3200" dirty="0" smtClean="0"/>
+              <a:rPr lang="de-DE" sz="3200" dirty="0"/>
               <a:t>Bieten Hilfefunktion nach Aktivierung an</a:t>
             </a:r>
           </a:p>
           <a:p>
             <a:r>
-              <a:rPr lang="de-DE" sz="3200" dirty="0" smtClean="0"/>
+              <a:rPr lang="de-DE" sz="3200" dirty="0"/>
               <a:t>In verschiedenen Varianten zu finden</a:t>
             </a:r>
-            <a:endParaRPr lang="de-DE" sz="3200" dirty="0"/>
           </a:p>
         </p:txBody>
       </p:sp>
       <p:pic>
         <p:nvPicPr>
-          <p:cNvPr id="4" name="Grafik 3"/>
+          <p:cNvPr id="6" name="Grafik 5"/>
           <p:cNvPicPr>
             <a:picLocks noChangeAspect="1"/>
           </p:cNvPicPr>
@@ -3421,8 +3368,8 @@
         </p:blipFill>
         <p:spPr>
           <a:xfrm>
-            <a:off x="1986835" y="5168987"/>
-            <a:ext cx="8888889" cy="1396825"/>
+            <a:off x="2873267" y="5273337"/>
+            <a:ext cx="5762416" cy="1584664"/>
           </a:xfrm>
           <a:prstGeom prst="rect">
             <a:avLst/>
@@ -3439,13 +3386,6 @@
   <p:clrMapOvr>
     <a:masterClrMapping/>
   </p:clrMapOvr>
-  <p:timing>
-    <p:tnLst>
-      <p:par>
-        <p:cTn id="1" dur="indefinite" restart="never" nodeType="tmRoot"/>
-      </p:par>
-    </p:tnLst>
-  </p:timing>
 </p:sld>
 </file>
 
@@ -3478,49 +3418,249 @@
         </p:nvSpPr>
         <p:spPr/>
         <p:txBody>
-          <a:bodyPr/>
-          <a:lstStyle/>
-          <a:p>
-            <a:r>
-              <a:rPr lang="de-DE" sz="4800" dirty="0" smtClean="0"/>
-              <a:t>Steuerung</a:t>
-            </a:r>
-            <a:endParaRPr lang="de-DE" dirty="0"/>
-          </a:p>
-        </p:txBody>
-      </p:sp>
-      <p:sp>
-        <p:nvSpPr>
-          <p:cNvPr id="3" name="Inhaltsplatzhalter 2"/>
-          <p:cNvSpPr>
-            <a:spLocks noGrp="1"/>
-          </p:cNvSpPr>
-          <p:nvPr>
-            <p:ph idx="1"/>
-          </p:nvPr>
-        </p:nvSpPr>
-        <p:spPr/>
-        <p:txBody>
           <a:bodyPr>
             <a:normAutofit/>
           </a:bodyPr>
           <a:lstStyle/>
           <a:p>
             <a:r>
-              <a:rPr lang="de-DE" sz="3200" dirty="0" smtClean="0"/>
-              <a:t>Links / Rechts laufen / Springen / Doppelsprung / Ducken</a:t>
-            </a:r>
-          </a:p>
-          <a:p>
-            <a:r>
-              <a:rPr lang="de-DE" sz="3200" dirty="0" smtClean="0"/>
-              <a:t>Schießen / Mit Objekten interagieren</a:t>
-            </a:r>
-          </a:p>
-          <a:p>
-            <a:r>
-              <a:rPr lang="de-DE" sz="3200" dirty="0" smtClean="0"/>
-              <a:t>Menü aufrufen</a:t>
+              <a:rPr lang="de-DE" sz="4800" dirty="0"/>
+              <a:t>Steuerung / Interaktionen</a:t>
+            </a:r>
+            <a:endParaRPr lang="de-DE" dirty="0"/>
+          </a:p>
+        </p:txBody>
+      </p:sp>
+      <p:pic>
+        <p:nvPicPr>
+          <p:cNvPr id="6" name="Inhaltsplatzhalter 5"/>
+          <p:cNvPicPr>
+            <a:picLocks noGrp="1" noChangeAspect="1"/>
+          </p:cNvPicPr>
+          <p:nvPr>
+            <p:ph idx="1"/>
+          </p:nvPr>
+        </p:nvPicPr>
+        <p:blipFill>
+          <a:blip r:embed="rId2">
+            <a:extLst>
+              <a:ext uri="{28A0092B-C50C-407E-A947-70E740481C1C}">
+                <a14:useLocalDpi xmlns:a14="http://schemas.microsoft.com/office/drawing/2010/main" val="0"/>
+              </a:ext>
+            </a:extLst>
+          </a:blip>
+          <a:stretch>
+            <a:fillRect/>
+          </a:stretch>
+        </p:blipFill>
+        <p:spPr>
+          <a:xfrm>
+            <a:off x="2935005" y="5193438"/>
+            <a:ext cx="5700678" cy="1567686"/>
+          </a:xfrm>
+        </p:spPr>
+      </p:pic>
+      <p:sp>
+        <p:nvSpPr>
+          <p:cNvPr id="7" name="Inhaltsplatzhalter 2"/>
+          <p:cNvSpPr txBox="1">
+            <a:spLocks/>
+          </p:cNvSpPr>
+          <p:nvPr/>
+        </p:nvSpPr>
+        <p:spPr>
+          <a:xfrm>
+            <a:off x="838200" y="1825625"/>
+            <a:ext cx="10515600" cy="2799641"/>
+          </a:xfrm>
+          <a:prstGeom prst="rect">
+            <a:avLst/>
+          </a:prstGeom>
+        </p:spPr>
+        <p:txBody>
+          <a:bodyPr vert="horz" lIns="91440" tIns="45720" rIns="91440" bIns="45720" rtlCol="0">
+            <a:normAutofit/>
+          </a:bodyPr>
+          <a:lstStyle>
+            <a:lvl1pPr marL="228600" indent="-228600" algn="l" defTabSz="914400" rtl="0" eaLnBrk="1" latinLnBrk="0" hangingPunct="1">
+              <a:lnSpc>
+                <a:spcPct val="90000"/>
+              </a:lnSpc>
+              <a:spcBef>
+                <a:spcPts val="1000"/>
+              </a:spcBef>
+              <a:buFont typeface="Arial" panose="020B0604020202020204" pitchFamily="34" charset="0"/>
+              <a:buChar char="•"/>
+              <a:defRPr sz="2800" kern="1200">
+                <a:solidFill>
+                  <a:schemeClr val="tx1"/>
+                </a:solidFill>
+                <a:latin typeface="+mn-lt"/>
+                <a:ea typeface="+mn-ea"/>
+                <a:cs typeface="+mn-cs"/>
+              </a:defRPr>
+            </a:lvl1pPr>
+            <a:lvl2pPr marL="685800" indent="-228600" algn="l" defTabSz="914400" rtl="0" eaLnBrk="1" latinLnBrk="0" hangingPunct="1">
+              <a:lnSpc>
+                <a:spcPct val="90000"/>
+              </a:lnSpc>
+              <a:spcBef>
+                <a:spcPts val="500"/>
+              </a:spcBef>
+              <a:buFont typeface="Arial" panose="020B0604020202020204" pitchFamily="34" charset="0"/>
+              <a:buChar char="•"/>
+              <a:defRPr sz="2400" kern="1200">
+                <a:solidFill>
+                  <a:schemeClr val="tx1"/>
+                </a:solidFill>
+                <a:latin typeface="+mn-lt"/>
+                <a:ea typeface="+mn-ea"/>
+                <a:cs typeface="+mn-cs"/>
+              </a:defRPr>
+            </a:lvl2pPr>
+            <a:lvl3pPr marL="1143000" indent="-228600" algn="l" defTabSz="914400" rtl="0" eaLnBrk="1" latinLnBrk="0" hangingPunct="1">
+              <a:lnSpc>
+                <a:spcPct val="90000"/>
+              </a:lnSpc>
+              <a:spcBef>
+                <a:spcPts val="500"/>
+              </a:spcBef>
+              <a:buFont typeface="Arial" panose="020B0604020202020204" pitchFamily="34" charset="0"/>
+              <a:buChar char="•"/>
+              <a:defRPr sz="2000" kern="1200">
+                <a:solidFill>
+                  <a:schemeClr val="tx1"/>
+                </a:solidFill>
+                <a:latin typeface="+mn-lt"/>
+                <a:ea typeface="+mn-ea"/>
+                <a:cs typeface="+mn-cs"/>
+              </a:defRPr>
+            </a:lvl3pPr>
+            <a:lvl4pPr marL="1600200" indent="-228600" algn="l" defTabSz="914400" rtl="0" eaLnBrk="1" latinLnBrk="0" hangingPunct="1">
+              <a:lnSpc>
+                <a:spcPct val="90000"/>
+              </a:lnSpc>
+              <a:spcBef>
+                <a:spcPts val="500"/>
+              </a:spcBef>
+              <a:buFont typeface="Arial" panose="020B0604020202020204" pitchFamily="34" charset="0"/>
+              <a:buChar char="•"/>
+              <a:defRPr sz="1800" kern="1200">
+                <a:solidFill>
+                  <a:schemeClr val="tx1"/>
+                </a:solidFill>
+                <a:latin typeface="+mn-lt"/>
+                <a:ea typeface="+mn-ea"/>
+                <a:cs typeface="+mn-cs"/>
+              </a:defRPr>
+            </a:lvl4pPr>
+            <a:lvl5pPr marL="2057400" indent="-228600" algn="l" defTabSz="914400" rtl="0" eaLnBrk="1" latinLnBrk="0" hangingPunct="1">
+              <a:lnSpc>
+                <a:spcPct val="90000"/>
+              </a:lnSpc>
+              <a:spcBef>
+                <a:spcPts val="500"/>
+              </a:spcBef>
+              <a:buFont typeface="Arial" panose="020B0604020202020204" pitchFamily="34" charset="0"/>
+              <a:buChar char="•"/>
+              <a:defRPr sz="1800" kern="1200">
+                <a:solidFill>
+                  <a:schemeClr val="tx1"/>
+                </a:solidFill>
+                <a:latin typeface="+mn-lt"/>
+                <a:ea typeface="+mn-ea"/>
+                <a:cs typeface="+mn-cs"/>
+              </a:defRPr>
+            </a:lvl5pPr>
+            <a:lvl6pPr marL="2514600" indent="-228600" algn="l" defTabSz="914400" rtl="0" eaLnBrk="1" latinLnBrk="0" hangingPunct="1">
+              <a:lnSpc>
+                <a:spcPct val="90000"/>
+              </a:lnSpc>
+              <a:spcBef>
+                <a:spcPts val="500"/>
+              </a:spcBef>
+              <a:buFont typeface="Arial" panose="020B0604020202020204" pitchFamily="34" charset="0"/>
+              <a:buChar char="•"/>
+              <a:defRPr sz="1800" kern="1200">
+                <a:solidFill>
+                  <a:schemeClr val="tx1"/>
+                </a:solidFill>
+                <a:latin typeface="+mn-lt"/>
+                <a:ea typeface="+mn-ea"/>
+                <a:cs typeface="+mn-cs"/>
+              </a:defRPr>
+            </a:lvl6pPr>
+            <a:lvl7pPr marL="2971800" indent="-228600" algn="l" defTabSz="914400" rtl="0" eaLnBrk="1" latinLnBrk="0" hangingPunct="1">
+              <a:lnSpc>
+                <a:spcPct val="90000"/>
+              </a:lnSpc>
+              <a:spcBef>
+                <a:spcPts val="500"/>
+              </a:spcBef>
+              <a:buFont typeface="Arial" panose="020B0604020202020204" pitchFamily="34" charset="0"/>
+              <a:buChar char="•"/>
+              <a:defRPr sz="1800" kern="1200">
+                <a:solidFill>
+                  <a:schemeClr val="tx1"/>
+                </a:solidFill>
+                <a:latin typeface="+mn-lt"/>
+                <a:ea typeface="+mn-ea"/>
+                <a:cs typeface="+mn-cs"/>
+              </a:defRPr>
+            </a:lvl7pPr>
+            <a:lvl8pPr marL="3429000" indent="-228600" algn="l" defTabSz="914400" rtl="0" eaLnBrk="1" latinLnBrk="0" hangingPunct="1">
+              <a:lnSpc>
+                <a:spcPct val="90000"/>
+              </a:lnSpc>
+              <a:spcBef>
+                <a:spcPts val="500"/>
+              </a:spcBef>
+              <a:buFont typeface="Arial" panose="020B0604020202020204" pitchFamily="34" charset="0"/>
+              <a:buChar char="•"/>
+              <a:defRPr sz="1800" kern="1200">
+                <a:solidFill>
+                  <a:schemeClr val="tx1"/>
+                </a:solidFill>
+                <a:latin typeface="+mn-lt"/>
+                <a:ea typeface="+mn-ea"/>
+                <a:cs typeface="+mn-cs"/>
+              </a:defRPr>
+            </a:lvl8pPr>
+            <a:lvl9pPr marL="3886200" indent="-228600" algn="l" defTabSz="914400" rtl="0" eaLnBrk="1" latinLnBrk="0" hangingPunct="1">
+              <a:lnSpc>
+                <a:spcPct val="90000"/>
+              </a:lnSpc>
+              <a:spcBef>
+                <a:spcPts val="500"/>
+              </a:spcBef>
+              <a:buFont typeface="Arial" panose="020B0604020202020204" pitchFamily="34" charset="0"/>
+              <a:buChar char="•"/>
+              <a:defRPr sz="1800" kern="1200">
+                <a:solidFill>
+                  <a:schemeClr val="tx1"/>
+                </a:solidFill>
+                <a:latin typeface="+mn-lt"/>
+                <a:ea typeface="+mn-ea"/>
+                <a:cs typeface="+mn-cs"/>
+              </a:defRPr>
+            </a:lvl9pPr>
+          </a:lstStyle>
+          <a:p>
+            <a:r>
+              <a:rPr lang="de-DE" sz="3200" dirty="0"/>
+              <a:t>Standard-Bewegungen</a:t>
+            </a:r>
+          </a:p>
+          <a:p>
+            <a:r>
+              <a:rPr lang="de-DE" sz="3200" dirty="0"/>
+              <a:t>Doppel Sprung</a:t>
+            </a:r>
+          </a:p>
+          <a:p>
+            <a:r>
+              <a:rPr lang="de-DE" sz="3200" dirty="0"/>
+              <a:t>Kampf: Schießen / Nahkampfattacke</a:t>
             </a:r>
           </a:p>
         </p:txBody>
@@ -3535,131 +3675,10 @@
   <p:clrMapOvr>
     <a:masterClrMapping/>
   </p:clrMapOvr>
-  <p:timing>
-    <p:tnLst>
-      <p:par>
-        <p:cTn id="1" dur="indefinite" restart="never" nodeType="tmRoot"/>
-      </p:par>
-    </p:tnLst>
-  </p:timing>
 </p:sld>
 </file>
 
 <file path=ppt/slides/slide7.xml><?xml version="1.0" encoding="utf-8"?>
-<p:sld xmlns:a="http://schemas.openxmlformats.org/drawingml/2006/main" xmlns:r="http://schemas.openxmlformats.org/officeDocument/2006/relationships" xmlns:p="http://schemas.openxmlformats.org/presentationml/2006/main">
-  <p:cSld>
-    <p:spTree>
-      <p:nvGrpSpPr>
-        <p:cNvPr id="1" name=""/>
-        <p:cNvGrpSpPr/>
-        <p:nvPr/>
-      </p:nvGrpSpPr>
-      <p:grpSpPr>
-        <a:xfrm>
-          <a:off x="0" y="0"/>
-          <a:ext cx="0" cy="0"/>
-          <a:chOff x="0" y="0"/>
-          <a:chExt cx="0" cy="0"/>
-        </a:xfrm>
-      </p:grpSpPr>
-      <p:sp>
-        <p:nvSpPr>
-          <p:cNvPr id="2" name="Titel 1"/>
-          <p:cNvSpPr>
-            <a:spLocks noGrp="1"/>
-          </p:cNvSpPr>
-          <p:nvPr>
-            <p:ph type="title"/>
-          </p:nvPr>
-        </p:nvSpPr>
-        <p:spPr/>
-        <p:txBody>
-          <a:bodyPr>
-            <a:normAutofit/>
-          </a:bodyPr>
-          <a:lstStyle/>
-          <a:p>
-            <a:r>
-              <a:rPr lang="de-DE" sz="4800" dirty="0" smtClean="0"/>
-              <a:t>Optionale Features</a:t>
-            </a:r>
-            <a:endParaRPr lang="de-DE" sz="4800" dirty="0"/>
-          </a:p>
-        </p:txBody>
-      </p:sp>
-      <p:sp>
-        <p:nvSpPr>
-          <p:cNvPr id="3" name="Inhaltsplatzhalter 2"/>
-          <p:cNvSpPr>
-            <a:spLocks noGrp="1"/>
-          </p:cNvSpPr>
-          <p:nvPr>
-            <p:ph idx="1"/>
-          </p:nvPr>
-        </p:nvSpPr>
-        <p:spPr/>
-        <p:txBody>
-          <a:bodyPr>
-            <a:normAutofit/>
-          </a:bodyPr>
-          <a:lstStyle/>
-          <a:p>
-            <a:r>
-              <a:rPr lang="de-DE" sz="3200" dirty="0" smtClean="0"/>
-              <a:t>Kontakt mit Flüssigkeit lässt den Spieler sich verwandeln</a:t>
-            </a:r>
-          </a:p>
-          <a:p>
-            <a:pPr lvl="1">
-              <a:buFont typeface="Wingdings" panose="05000000000000000000" pitchFamily="2" charset="2"/>
-              <a:buChar char="à"/>
-            </a:pPr>
-            <a:r>
-              <a:rPr lang="de-DE" sz="2800" dirty="0" smtClean="0">
-                <a:sym typeface="Wingdings" panose="05000000000000000000" pitchFamily="2" charset="2"/>
-              </a:rPr>
-              <a:t>Vorteile / Nachteile</a:t>
-            </a:r>
-          </a:p>
-          <a:p>
-            <a:r>
-              <a:rPr lang="de-DE" sz="3200" dirty="0" smtClean="0">
-                <a:sym typeface="Wingdings" panose="05000000000000000000" pitchFamily="2" charset="2"/>
-              </a:rPr>
-              <a:t>Fallen aktivieren / deaktivieren</a:t>
-            </a:r>
-          </a:p>
-          <a:p>
-            <a:r>
-              <a:rPr lang="de-DE" sz="3200" dirty="0" smtClean="0">
-                <a:sym typeface="Wingdings" panose="05000000000000000000" pitchFamily="2" charset="2"/>
-              </a:rPr>
-              <a:t>Endgegner am Raumschiff</a:t>
-            </a:r>
-          </a:p>
-        </p:txBody>
-      </p:sp>
-    </p:spTree>
-    <p:extLst>
-      <p:ext uri="{BB962C8B-B14F-4D97-AF65-F5344CB8AC3E}">
-        <p14:creationId xmlns:p14="http://schemas.microsoft.com/office/powerpoint/2010/main" val="3877541768"/>
-      </p:ext>
-    </p:extLst>
-  </p:cSld>
-  <p:clrMapOvr>
-    <a:masterClrMapping/>
-  </p:clrMapOvr>
-  <p:timing>
-    <p:tnLst>
-      <p:par>
-        <p:cTn id="1" dur="indefinite" restart="never" nodeType="tmRoot"/>
-      </p:par>
-    </p:tnLst>
-  </p:timing>
-</p:sld>
-</file>
-
-<file path=ppt/slides/slide8.xml><?xml version="1.0" encoding="utf-8"?>
 <p:sld xmlns:a="http://schemas.openxmlformats.org/drawingml/2006/main" xmlns:r="http://schemas.openxmlformats.org/officeDocument/2006/relationships" xmlns:p="http://schemas.openxmlformats.org/presentationml/2006/main">
   <p:cSld>
     <p:spTree>
@@ -3716,13 +3735,157 @@
   <p:clrMapOvr>
     <a:masterClrMapping/>
   </p:clrMapOvr>
-  <p:timing>
-    <p:tnLst>
-      <p:par>
-        <p:cTn id="1" dur="indefinite" restart="never" nodeType="tmRoot"/>
-      </p:par>
-    </p:tnLst>
-  </p:timing>
+</p:sld>
+</file>
+
+<file path=ppt/slides/slide8.xml><?xml version="1.0" encoding="utf-8"?>
+<p:sld xmlns:a="http://schemas.openxmlformats.org/drawingml/2006/main" xmlns:r="http://schemas.openxmlformats.org/officeDocument/2006/relationships" xmlns:p="http://schemas.openxmlformats.org/presentationml/2006/main">
+  <p:cSld>
+    <p:spTree>
+      <p:nvGrpSpPr>
+        <p:cNvPr id="1" name=""/>
+        <p:cNvGrpSpPr/>
+        <p:nvPr/>
+      </p:nvGrpSpPr>
+      <p:grpSpPr>
+        <a:xfrm>
+          <a:off x="0" y="0"/>
+          <a:ext cx="0" cy="0"/>
+          <a:chOff x="0" y="0"/>
+          <a:chExt cx="0" cy="0"/>
+        </a:xfrm>
+      </p:grpSpPr>
+      <p:sp>
+        <p:nvSpPr>
+          <p:cNvPr id="2" name="Titel 1"/>
+          <p:cNvSpPr>
+            <a:spLocks noGrp="1"/>
+          </p:cNvSpPr>
+          <p:nvPr>
+            <p:ph type="title"/>
+          </p:nvPr>
+        </p:nvSpPr>
+        <p:spPr/>
+        <p:txBody>
+          <a:bodyPr>
+            <a:normAutofit/>
+          </a:bodyPr>
+          <a:lstStyle/>
+          <a:p>
+            <a:r>
+              <a:rPr lang="de-DE" sz="4800" dirty="0"/>
+              <a:t>Optionale Features (Ziele)</a:t>
+            </a:r>
+          </a:p>
+        </p:txBody>
+      </p:sp>
+      <p:sp>
+        <p:nvSpPr>
+          <p:cNvPr id="3" name="Inhaltsplatzhalter 2"/>
+          <p:cNvSpPr>
+            <a:spLocks noGrp="1"/>
+          </p:cNvSpPr>
+          <p:nvPr>
+            <p:ph idx="1"/>
+          </p:nvPr>
+        </p:nvSpPr>
+        <p:spPr>
+          <a:xfrm>
+            <a:off x="838200" y="1825625"/>
+            <a:ext cx="10515600" cy="4351338"/>
+          </a:xfrm>
+        </p:spPr>
+        <p:txBody>
+          <a:bodyPr>
+            <a:normAutofit/>
+          </a:bodyPr>
+          <a:lstStyle/>
+          <a:p>
+            <a:r>
+              <a:rPr lang="de-DE" sz="3200" dirty="0">
+                <a:sym typeface="Wingdings" panose="05000000000000000000" pitchFamily="2" charset="2"/>
+              </a:rPr>
+              <a:t>Endgegner am Raumschiff</a:t>
+            </a:r>
+            <a:endParaRPr lang="de-DE" sz="3200" dirty="0"/>
+          </a:p>
+          <a:p>
+            <a:r>
+              <a:rPr lang="de-DE" sz="3200" dirty="0"/>
+              <a:t>Kontakt mit Flüssigkeit lässt</a:t>
+            </a:r>
+          </a:p>
+          <a:p>
+            <a:pPr marL="0" indent="0">
+              <a:buNone/>
+            </a:pPr>
+            <a:r>
+              <a:rPr lang="de-DE" sz="3200" dirty="0"/>
+              <a:t>  den Spieler sich verwandeln</a:t>
+            </a:r>
+          </a:p>
+          <a:p>
+            <a:pPr lvl="1">
+              <a:buFont typeface="Wingdings" panose="05000000000000000000" pitchFamily="2" charset="2"/>
+              <a:buChar char="à"/>
+            </a:pPr>
+            <a:r>
+              <a:rPr lang="de-DE" sz="2800" dirty="0">
+                <a:sym typeface="Wingdings" panose="05000000000000000000" pitchFamily="2" charset="2"/>
+              </a:rPr>
+              <a:t>Vorteile / Nachteile</a:t>
+            </a:r>
+          </a:p>
+          <a:p>
+            <a:r>
+              <a:rPr lang="de-DE" sz="3200" dirty="0">
+                <a:sym typeface="Wingdings" panose="05000000000000000000" pitchFamily="2" charset="2"/>
+              </a:rPr>
+              <a:t>Fallen aktivieren / deaktivieren</a:t>
+            </a:r>
+          </a:p>
+        </p:txBody>
+      </p:sp>
+      <p:pic>
+        <p:nvPicPr>
+          <p:cNvPr id="7" name="Grafik 6"/>
+          <p:cNvPicPr>
+            <a:picLocks noChangeAspect="1"/>
+          </p:cNvPicPr>
+          <p:nvPr/>
+        </p:nvPicPr>
+        <p:blipFill>
+          <a:blip r:embed="rId2">
+            <a:extLst>
+              <a:ext uri="{28A0092B-C50C-407E-A947-70E740481C1C}">
+                <a14:useLocalDpi xmlns:a14="http://schemas.microsoft.com/office/drawing/2010/main" val="0"/>
+              </a:ext>
+            </a:extLst>
+          </a:blip>
+          <a:stretch>
+            <a:fillRect/>
+          </a:stretch>
+        </p:blipFill>
+        <p:spPr>
+          <a:xfrm>
+            <a:off x="7224665" y="-930932"/>
+            <a:ext cx="8476908" cy="8476908"/>
+          </a:xfrm>
+          <a:prstGeom prst="rect">
+            <a:avLst/>
+          </a:prstGeom>
+        </p:spPr>
+      </p:pic>
+    </p:spTree>
+    <p:extLst>
+      <p:ext uri="{BB962C8B-B14F-4D97-AF65-F5344CB8AC3E}">
+        <p14:creationId xmlns:p14="http://schemas.microsoft.com/office/powerpoint/2010/main" val="3877541768"/>
+      </p:ext>
+    </p:extLst>
+  </p:cSld>
+  <p:clrMapOvr>
+    <a:masterClrMapping/>
+  </p:clrMapOvr>
 </p:sld>
 </file>
 

</xml_diff>